<commit_message>
database connection successful replacing jsons
</commit_message>
<xml_diff>
--- a/Τελική Παρουσίαση.pptx
+++ b/Τελική Παρουσίαση.pptx
@@ -5,21 +5,20 @@
     <p:sldMasterId id="2147483648" r:id="rId4"/>
   </p:sldMasterIdLst>
   <p:notesMasterIdLst>
-    <p:notesMasterId r:id="rId9"/>
+    <p:notesMasterId r:id="rId8"/>
   </p:notesMasterIdLst>
   <p:handoutMasterIdLst>
-    <p:handoutMasterId r:id="rId10"/>
+    <p:handoutMasterId r:id="rId9"/>
   </p:handoutMasterIdLst>
   <p:sldIdLst>
     <p:sldId id="314" r:id="rId5"/>
-    <p:sldId id="318" r:id="rId6"/>
-    <p:sldId id="316" r:id="rId7"/>
-    <p:sldId id="317" r:id="rId8"/>
+    <p:sldId id="316" r:id="rId6"/>
+    <p:sldId id="317" r:id="rId7"/>
   </p:sldIdLst>
   <p:sldSz cx="12188825" cy="6858000"/>
   <p:notesSz cx="6858000" cy="9144000"/>
   <p:custDataLst>
-    <p:tags r:id="rId11"/>
+    <p:tags r:id="rId10"/>
   </p:custDataLst>
   <p:defaultTextStyle>
     <a:defPPr rtl="0">
@@ -818,7 +817,7 @@
             <a:fld id="{F93199CD-3E1B-4AE6-990F-76F925F5EA9F}" type="slidenum">
               <a:rPr lang="el-GR" smtClean="0"/>
               <a:pPr/>
-              <a:t>3</a:t>
+              <a:t>2</a:t>
             </a:fld>
             <a:endParaRPr lang="el-GR" dirty="0"/>
           </a:p>
@@ -903,7 +902,7 @@
             <a:fld id="{F93199CD-3E1B-4AE6-990F-76F925F5EA9F}" type="slidenum">
               <a:rPr lang="el-GR" smtClean="0"/>
               <a:pPr/>
-              <a:t>4</a:t>
+              <a:t>3</a:t>
             </a:fld>
             <a:endParaRPr lang="el-GR" dirty="0"/>
           </a:p>
@@ -4469,114 +4468,6 @@
       </p:grpSpPr>
       <p:sp>
         <p:nvSpPr>
-          <p:cNvPr id="7" name="Title 6">
-            <a:extLst>
-              <a:ext uri="{FF2B5EF4-FFF2-40B4-BE49-F238E27FC236}">
-                <a16:creationId xmlns:a16="http://schemas.microsoft.com/office/drawing/2014/main" id="{7427E2A1-98AE-20E7-A6D6-EEEBC0487FE8}"/>
-              </a:ext>
-            </a:extLst>
-          </p:cNvPr>
-          <p:cNvSpPr>
-            <a:spLocks noGrp="1"/>
-          </p:cNvSpPr>
-          <p:nvPr>
-            <p:ph type="title"/>
-          </p:nvPr>
-        </p:nvSpPr>
-        <p:spPr>
-          <a:xfrm>
-            <a:off x="1522413" y="381000"/>
-            <a:ext cx="5076055" cy="671736"/>
-          </a:xfrm>
-        </p:spPr>
-        <p:txBody>
-          <a:bodyPr/>
-          <a:lstStyle/>
-          <a:p>
-            <a:r>
-              <a:rPr lang="el-GR" dirty="0"/>
-              <a:t>Διάγραμμα </a:t>
-            </a:r>
-            <a:r>
-              <a:rPr lang="en-US" dirty="0"/>
-              <a:t>ERD </a:t>
-            </a:r>
-            <a:r>
-              <a:rPr lang="el-GR" dirty="0"/>
-              <a:t>βάσης</a:t>
-            </a:r>
-          </a:p>
-        </p:txBody>
-      </p:sp>
-      <p:sp>
-        <p:nvSpPr>
-          <p:cNvPr id="3" name="Θέση περιεχομένου 2">
-            <a:extLst>
-              <a:ext uri="{FF2B5EF4-FFF2-40B4-BE49-F238E27FC236}">
-                <a16:creationId xmlns:a16="http://schemas.microsoft.com/office/drawing/2014/main" id="{0EB8480B-1B89-FE4C-07F4-450AEAD35955}"/>
-              </a:ext>
-            </a:extLst>
-          </p:cNvPr>
-          <p:cNvSpPr>
-            <a:spLocks noGrp="1"/>
-          </p:cNvSpPr>
-          <p:nvPr>
-            <p:ph idx="1"/>
-          </p:nvPr>
-        </p:nvSpPr>
-        <p:spPr/>
-        <p:txBody>
-          <a:bodyPr/>
-          <a:lstStyle/>
-          <a:p>
-            <a:endParaRPr lang="el-GR"/>
-          </a:p>
-        </p:txBody>
-      </p:sp>
-    </p:spTree>
-    <p:extLst>
-      <p:ext uri="{BB962C8B-B14F-4D97-AF65-F5344CB8AC3E}">
-        <p14:creationId xmlns:p14="http://schemas.microsoft.com/office/powerpoint/2010/main" val="1783682766"/>
-      </p:ext>
-    </p:extLst>
-  </p:cSld>
-  <p:clrMapOvr>
-    <a:masterClrMapping/>
-  </p:clrMapOvr>
-  <mc:AlternateContent xmlns:mc="http://schemas.openxmlformats.org/markup-compatibility/2006" xmlns:p14="http://schemas.microsoft.com/office/powerpoint/2010/main">
-    <mc:Choice Requires="p14">
-      <p:transition spd="med" p14:dur="700">
-        <p:fade/>
-      </p:transition>
-    </mc:Choice>
-    <mc:Fallback xmlns="">
-      <p:transition spd="med">
-        <p:fade/>
-      </p:transition>
-    </mc:Fallback>
-  </mc:AlternateContent>
-</p:sld>
-</file>
-
-<file path=ppt/slides/slide3.xml><?xml version="1.0" encoding="utf-8"?>
-<p:sld xmlns:a="http://schemas.openxmlformats.org/drawingml/2006/main" xmlns:r="http://schemas.openxmlformats.org/officeDocument/2006/relationships" xmlns:p="http://schemas.openxmlformats.org/presentationml/2006/main">
-  <p:cSld>
-    <p:spTree>
-      <p:nvGrpSpPr>
-        <p:cNvPr id="1" name=""/>
-        <p:cNvGrpSpPr/>
-        <p:nvPr/>
-      </p:nvGrpSpPr>
-      <p:grpSpPr>
-        <a:xfrm>
-          <a:off x="0" y="0"/>
-          <a:ext cx="0" cy="0"/>
-          <a:chOff x="0" y="0"/>
-          <a:chExt cx="0" cy="0"/>
-        </a:xfrm>
-      </p:grpSpPr>
-      <p:sp>
-        <p:nvSpPr>
           <p:cNvPr id="9" name="Θέση κειμένου 8">
             <a:extLst>
               <a:ext uri="{FF2B5EF4-FFF2-40B4-BE49-F238E27FC236}">
@@ -4998,7 +4889,7 @@
 </p:sld>
 </file>
 
-<file path=ppt/slides/slide4.xml><?xml version="1.0" encoding="utf-8"?>
+<file path=ppt/slides/slide3.xml><?xml version="1.0" encoding="utf-8"?>
 <p:sld xmlns:a="http://schemas.openxmlformats.org/drawingml/2006/main" xmlns:r="http://schemas.openxmlformats.org/officeDocument/2006/relationships" xmlns:p="http://schemas.openxmlformats.org/presentationml/2006/main">
   <p:cSld>
     <p:spTree>
@@ -6032,6 +5923,15 @@
 </file>
 
 <file path=customXml/item2.xml><?xml version="1.0" encoding="utf-8"?>
+<?mso-contentType ?>
+<FormTemplates xmlns="http://schemas.microsoft.com/sharepoint/v3/contenttype/forms">
+  <Display>DocumentLibraryForm</Display>
+  <Edit>AssetEditForm</Edit>
+  <New>DocumentLibraryForm</New>
+</FormTemplates>
+</file>
+
+<file path=customXml/item3.xml><?xml version="1.0" encoding="utf-8"?>
 <ct:contentTypeSchema xmlns:ct="http://schemas.microsoft.com/office/2006/metadata/contentType" xmlns:ma="http://schemas.microsoft.com/office/2006/metadata/properties/metaAttributes" ct:_="" ma:_="" ma:contentTypeName="TemplateFile" ma:contentTypeID="0x0101006EDDDB5EE6D98C44930B742096920B300400F5B6D36B3EF94B4E9A635CDF2A18F5B8" ma:contentTypeVersion="72" ma:contentTypeDescription="Create a new document." ma:contentTypeScope="" ma:versionID="a23e56308344d904b51738559c3d67c9">
   <xsd:schema xmlns:xsd="http://www.w3.org/2001/XMLSchema" xmlns:xs="http://www.w3.org/2001/XMLSchema" xmlns:p="http://schemas.microsoft.com/office/2006/metadata/properties" xmlns:ns2="4873beb7-5857-4685-be1f-d57550cc96cc" targetNamespace="http://schemas.microsoft.com/office/2006/metadata/properties" ma:root="true" ma:fieldsID="cd0908cc4600e77bf5da051303e00c8d" ns2:_="">
     <xsd:import namespace="4873beb7-5857-4685-be1f-d57550cc96cc"/>
@@ -7071,15 +6971,6 @@
 </ct:contentTypeSchema>
 </file>
 
-<file path=customXml/item3.xml><?xml version="1.0" encoding="utf-8"?>
-<?mso-contentType ?>
-<FormTemplates xmlns="http://schemas.microsoft.com/sharepoint/v3/contenttype/forms">
-  <Display>DocumentLibraryForm</Display>
-  <Edit>AssetEditForm</Edit>
-  <New>DocumentLibraryForm</New>
-</FormTemplates>
-</file>
-
 <file path=customXml/itemProps1.xml><?xml version="1.0" encoding="utf-8"?>
 <ds:datastoreItem xmlns:ds="http://schemas.openxmlformats.org/officeDocument/2006/customXml" ds:itemID="{00E41224-0370-4595-877C-23316CD80004}">
   <ds:schemaRefs>
@@ -7093,6 +6984,14 @@
 </file>
 
 <file path=customXml/itemProps2.xml><?xml version="1.0" encoding="utf-8"?>
+<ds:datastoreItem xmlns:ds="http://schemas.openxmlformats.org/officeDocument/2006/customXml" ds:itemID="{74228E6B-D70C-44BB-A81F-A245495F612B}">
+  <ds:schemaRefs>
+    <ds:schemaRef ds:uri="http://schemas.microsoft.com/sharepoint/v3/contenttype/forms"/>
+  </ds:schemaRefs>
+</ds:datastoreItem>
+</file>
+
+<file path=customXml/itemProps3.xml><?xml version="1.0" encoding="utf-8"?>
 <ds:datastoreItem xmlns:ds="http://schemas.openxmlformats.org/officeDocument/2006/customXml" ds:itemID="{22CCB507-0646-4A50-A4F7-7F385079D589}">
   <ds:schemaRefs>
     <ds:schemaRef ds:uri="http://schemas.microsoft.com/office/2006/metadata/contentType"/>
@@ -7109,12 +7008,4 @@
     <ds:schemaRef ds:uri="http://schemas.microsoft.com/internal/obd"/>
   </ds:schemaRefs>
 </ds:datastoreItem>
-</file>
-
-<file path=customXml/itemProps3.xml><?xml version="1.0" encoding="utf-8"?>
-<ds:datastoreItem xmlns:ds="http://schemas.openxmlformats.org/officeDocument/2006/customXml" ds:itemID="{74228E6B-D70C-44BB-A81F-A245495F612B}">
-  <ds:schemaRefs>
-    <ds:schemaRef ds:uri="http://schemas.microsoft.com/sharepoint/v3/contenttype/forms"/>
-  </ds:schemaRefs>
-</ds:datastoreItem>
 </file>
</xml_diff>